<commit_message>
Last change for right now...
</commit_message>
<xml_diff>
--- a/Presentation.pptx
+++ b/Presentation.pptx
@@ -6695,7 +6695,7 @@
         <p:spPr>
           <a:xfrm>
             <a:off x="337445" y="1792966"/>
-            <a:ext cx="5667778" cy="3778518"/>
+            <a:ext cx="5667777" cy="3778518"/>
           </a:xfrm>
         </p:spPr>
       </p:pic>
@@ -6895,6 +6895,19 @@
             </a:r>
           </a:p>
           <a:p>
+            <a:r>
+              <a:rPr lang="en-US" dirty="0" smtClean="0"/>
+              <a:t>Run batch files using different start times and do analysis</a:t>
+            </a:r>
+          </a:p>
+          <a:p>
+            <a:pPr lvl="1"/>
+            <a:r>
+              <a:rPr lang="en-US" dirty="0" smtClean="0"/>
+              <a:t>See how students skipping a course affects the infection spread</a:t>
+            </a:r>
+          </a:p>
+          <a:p>
             <a:endParaRPr lang="en-US" dirty="0" smtClean="0"/>
           </a:p>
           <a:p>
@@ -6972,13 +6985,9 @@
           <a:p>
             <a:r>
               <a:rPr lang="en-US" dirty="0" smtClean="0"/>
-              <a:t>References available in </a:t>
-            </a:r>
-            <a:r>
-              <a:rPr lang="en-US" smtClean="0"/>
-              <a:t>final deliverable</a:t>
-            </a:r>
-            <a:endParaRPr lang="en-US"/>
+              <a:t>References available in final deliverable</a:t>
+            </a:r>
+            <a:endParaRPr lang="en-US" dirty="0"/>
           </a:p>
         </p:txBody>
       </p:sp>

</xml_diff>